<commit_message>
Updating Ellipse Help and Image
</commit_message>
<xml_diff>
--- a/Images/images.pptx
+++ b/Images/images.pptx
@@ -9,6 +9,7 @@
     <p:sldId id="257" r:id="rId3"/>
     <p:sldId id="258" r:id="rId4"/>
     <p:sldId id="259" r:id="rId5"/>
+    <p:sldId id="260" r:id="rId6"/>
   </p:sldIdLst>
   <p:sldSz cx="12192000" cy="6858000"/>
   <p:notesSz cx="6858000" cy="9144000"/>
@@ -5160,6 +5161,220 @@
 </p:sld>
 </file>
 
+<file path=ppt/slides/slide5.xml><?xml version="1.0" encoding="utf-8"?>
+<p:sld xmlns:a="http://schemas.openxmlformats.org/drawingml/2006/main" xmlns:r="http://schemas.openxmlformats.org/officeDocument/2006/relationships" xmlns:p="http://schemas.openxmlformats.org/presentationml/2006/main">
+  <p:cSld>
+    <p:spTree>
+      <p:nvGrpSpPr>
+        <p:cNvPr id="1" name=""/>
+        <p:cNvGrpSpPr/>
+        <p:nvPr/>
+      </p:nvGrpSpPr>
+      <p:grpSpPr>
+        <a:xfrm>
+          <a:off x="0" y="0"/>
+          <a:ext cx="0" cy="0"/>
+          <a:chOff x="0" y="0"/>
+          <a:chExt cx="0" cy="0"/>
+        </a:xfrm>
+      </p:grpSpPr>
+      <p:sp>
+        <p:nvSpPr>
+          <p:cNvPr id="3" name="Oval 2">
+            <a:extLst>
+              <a:ext uri="{FF2B5EF4-FFF2-40B4-BE49-F238E27FC236}">
+                <a16:creationId xmlns:a16="http://schemas.microsoft.com/office/drawing/2014/main" id="{D689A422-05B5-754B-9756-1C88C82A7161}"/>
+              </a:ext>
+            </a:extLst>
+          </p:cNvPr>
+          <p:cNvSpPr/>
+          <p:nvPr/>
+        </p:nvSpPr>
+        <p:spPr>
+          <a:xfrm>
+            <a:off x="3759200" y="3947886"/>
+            <a:ext cx="3323771" cy="711200"/>
+          </a:xfrm>
+          <a:prstGeom prst="ellipse">
+            <a:avLst/>
+          </a:prstGeom>
+          <a:solidFill>
+            <a:schemeClr val="bg1">
+              <a:lumMod val="95000"/>
+            </a:schemeClr>
+          </a:solidFill>
+          <a:ln w="25400">
+            <a:solidFill>
+              <a:schemeClr val="tx1"/>
+            </a:solidFill>
+          </a:ln>
+        </p:spPr>
+        <p:style>
+          <a:lnRef idx="2">
+            <a:schemeClr val="accent1">
+              <a:shade val="50000"/>
+            </a:schemeClr>
+          </a:lnRef>
+          <a:fillRef idx="1">
+            <a:schemeClr val="accent1"/>
+          </a:fillRef>
+          <a:effectRef idx="0">
+            <a:schemeClr val="accent1"/>
+          </a:effectRef>
+          <a:fontRef idx="minor">
+            <a:schemeClr val="lt1"/>
+          </a:fontRef>
+        </p:style>
+        <p:txBody>
+          <a:bodyPr rtlCol="0" anchor="ctr"/>
+          <a:lstStyle/>
+          <a:p>
+            <a:pPr algn="ctr"/>
+            <a:endParaRPr lang="en-US"/>
+          </a:p>
+        </p:txBody>
+      </p:sp>
+      <p:cxnSp>
+        <p:nvCxnSpPr>
+          <p:cNvPr id="5" name="Straight Connector 4">
+            <a:extLst>
+              <a:ext uri="{FF2B5EF4-FFF2-40B4-BE49-F238E27FC236}">
+                <a16:creationId xmlns:a16="http://schemas.microsoft.com/office/drawing/2014/main" id="{3031406C-05F9-E847-81DC-AFC3D6855AFD}"/>
+              </a:ext>
+            </a:extLst>
+          </p:cNvPr>
+          <p:cNvCxnSpPr>
+            <a:cxnSpLocks/>
+            <a:endCxn id="3" idx="2"/>
+          </p:cNvCxnSpPr>
+          <p:nvPr/>
+        </p:nvCxnSpPr>
+        <p:spPr>
+          <a:xfrm flipH="1">
+            <a:off x="3759200" y="464457"/>
+            <a:ext cx="1582057" cy="3839029"/>
+          </a:xfrm>
+          <a:prstGeom prst="line">
+            <a:avLst/>
+          </a:prstGeom>
+          <a:ln w="25400"/>
+        </p:spPr>
+        <p:style>
+          <a:lnRef idx="1">
+            <a:schemeClr val="dk1"/>
+          </a:lnRef>
+          <a:fillRef idx="0">
+            <a:schemeClr val="dk1"/>
+          </a:fillRef>
+          <a:effectRef idx="0">
+            <a:schemeClr val="dk1"/>
+          </a:effectRef>
+          <a:fontRef idx="minor">
+            <a:schemeClr val="tx1"/>
+          </a:fontRef>
+        </p:style>
+      </p:cxnSp>
+      <p:cxnSp>
+        <p:nvCxnSpPr>
+          <p:cNvPr id="7" name="Straight Connector 6">
+            <a:extLst>
+              <a:ext uri="{FF2B5EF4-FFF2-40B4-BE49-F238E27FC236}">
+                <a16:creationId xmlns:a16="http://schemas.microsoft.com/office/drawing/2014/main" id="{ADF973CB-CFE2-B149-A92F-B834B0FC7954}"/>
+              </a:ext>
+            </a:extLst>
+          </p:cNvPr>
+          <p:cNvCxnSpPr>
+            <a:cxnSpLocks/>
+            <a:endCxn id="3" idx="6"/>
+          </p:cNvCxnSpPr>
+          <p:nvPr/>
+        </p:nvCxnSpPr>
+        <p:spPr>
+          <a:xfrm>
+            <a:off x="5370286" y="464457"/>
+            <a:ext cx="1712685" cy="3839029"/>
+          </a:xfrm>
+          <a:prstGeom prst="line">
+            <a:avLst/>
+          </a:prstGeom>
+          <a:ln w="25400">
+            <a:solidFill>
+              <a:schemeClr val="tx1"/>
+            </a:solidFill>
+          </a:ln>
+        </p:spPr>
+        <p:style>
+          <a:lnRef idx="1">
+            <a:schemeClr val="accent1"/>
+          </a:lnRef>
+          <a:fillRef idx="0">
+            <a:schemeClr val="accent1"/>
+          </a:fillRef>
+          <a:effectRef idx="0">
+            <a:schemeClr val="accent1"/>
+          </a:effectRef>
+          <a:fontRef idx="minor">
+            <a:schemeClr val="tx1"/>
+          </a:fontRef>
+        </p:style>
+      </p:cxnSp>
+      <p:cxnSp>
+        <p:nvCxnSpPr>
+          <p:cNvPr id="11" name="Straight Connector 10">
+            <a:extLst>
+              <a:ext uri="{FF2B5EF4-FFF2-40B4-BE49-F238E27FC236}">
+                <a16:creationId xmlns:a16="http://schemas.microsoft.com/office/drawing/2014/main" id="{CFA60829-125B-2E4E-BE18-B624B89AB1B9}"/>
+              </a:ext>
+            </a:extLst>
+          </p:cNvPr>
+          <p:cNvCxnSpPr>
+            <a:stCxn id="3" idx="2"/>
+          </p:cNvCxnSpPr>
+          <p:nvPr/>
+        </p:nvCxnSpPr>
+        <p:spPr>
+          <a:xfrm>
+            <a:off x="3759200" y="4303486"/>
+            <a:ext cx="1611086" cy="0"/>
+          </a:xfrm>
+          <a:prstGeom prst="line">
+            <a:avLst/>
+          </a:prstGeom>
+          <a:ln>
+            <a:solidFill>
+              <a:schemeClr val="tx1"/>
+            </a:solidFill>
+            <a:prstDash val="dash"/>
+          </a:ln>
+        </p:spPr>
+        <p:style>
+          <a:lnRef idx="1">
+            <a:schemeClr val="accent1"/>
+          </a:lnRef>
+          <a:fillRef idx="0">
+            <a:schemeClr val="accent1"/>
+          </a:fillRef>
+          <a:effectRef idx="0">
+            <a:schemeClr val="accent1"/>
+          </a:effectRef>
+          <a:fontRef idx="minor">
+            <a:schemeClr val="tx1"/>
+          </a:fontRef>
+        </p:style>
+      </p:cxnSp>
+    </p:spTree>
+    <p:extLst>
+      <p:ext uri="{BB962C8B-B14F-4D97-AF65-F5344CB8AC3E}">
+        <p14:creationId xmlns:p14="http://schemas.microsoft.com/office/powerpoint/2010/main" val="2863576315"/>
+      </p:ext>
+    </p:extLst>
+  </p:cSld>
+  <p:clrMapOvr>
+    <a:masterClrMapping/>
+  </p:clrMapOvr>
+</p:sld>
+</file>
+
 <file path=ppt/theme/theme1.xml><?xml version="1.0" encoding="utf-8"?>
 <a:theme xmlns:a="http://schemas.openxmlformats.org/drawingml/2006/main" name="Office Theme">
   <a:themeElements>

</xml_diff>